<commit_message>
proxy pattern + modifications
</commit_message>
<xml_diff>
--- a/design-patterns/Design patterns.pptx
+++ b/design-patterns/Design patterns.pptx
@@ -10,6 +10,8 @@
     <p:sldId id="258" r:id="rId4"/>
     <p:sldId id="259" r:id="rId5"/>
     <p:sldId id="260" r:id="rId6"/>
+    <p:sldId id="261" r:id="rId7"/>
+    <p:sldId id="262" r:id="rId8"/>
   </p:sldIdLst>
   <p:sldSz cx="12192000" cy="6858000"/>
   <p:notesSz cx="6858000" cy="9144000"/>
@@ -452,7 +454,7 @@
             <a:fld id="{5923F103-BC34-4FE4-A40E-EDDEECFDA5D0}" type="datetimeFigureOut">
               <a:rPr lang="en-US" dirty="0"/>
               <a:pPr/>
-              <a:t>5/16/2019</a:t>
+              <a:t>5/29/2019</a:t>
             </a:fld>
             <a:endParaRPr lang="en-US" dirty="0"/>
           </a:p>
@@ -1536,7 +1538,7 @@
           <a:p>
             <a:fld id="{923A1CC3-2375-41D4-9E03-427CAF2A4C1A}" type="datetimeFigureOut">
               <a:rPr lang="en-US" dirty="0"/>
-              <a:t>5/16/2019</a:t>
+              <a:t>5/29/2019</a:t>
             </a:fld>
             <a:endParaRPr lang="en-US" dirty="0"/>
           </a:p>
@@ -2512,7 +2514,7 @@
           <a:p>
             <a:fld id="{AFF16868-8199-4C2C-A5B1-63AEE139F88E}" type="datetimeFigureOut">
               <a:rPr lang="en-US" dirty="0"/>
-              <a:t>5/16/2019</a:t>
+              <a:t>5/29/2019</a:t>
             </a:fld>
             <a:endParaRPr lang="en-US" dirty="0"/>
           </a:p>
@@ -3642,7 +3644,7 @@
           <a:p>
             <a:fld id="{AAD9FF7F-6988-44CC-821B-644E70CD2F73}" type="datetimeFigureOut">
               <a:rPr lang="en-US" dirty="0"/>
-              <a:t>5/16/2019</a:t>
+              <a:t>5/29/2019</a:t>
             </a:fld>
             <a:endParaRPr lang="en-US" dirty="0"/>
           </a:p>
@@ -4671,7 +4673,7 @@
           <a:p>
             <a:fld id="{5C12C299-16B2-4475-990D-751901EACC14}" type="datetimeFigureOut">
               <a:rPr lang="en-US" dirty="0"/>
-              <a:t>5/16/2019</a:t>
+              <a:t>5/29/2019</a:t>
             </a:fld>
             <a:endParaRPr lang="en-US" dirty="0"/>
           </a:p>
@@ -5327,7 +5329,7 @@
           <a:p>
             <a:fld id="{9FE86839-B9D8-4651-8783-F325ECE74E65}" type="datetimeFigureOut">
               <a:rPr lang="en-US" dirty="0"/>
-              <a:t>5/16/2019</a:t>
+              <a:t>5/29/2019</a:t>
             </a:fld>
             <a:endParaRPr lang="en-US" dirty="0"/>
           </a:p>
@@ -6184,7 +6186,7 @@
           <a:p>
             <a:fld id="{FD484F64-32F6-45C5-931F-ADC1662401D0}" type="datetimeFigureOut">
               <a:rPr lang="en-US" dirty="0"/>
-              <a:t>5/16/2019</a:t>
+              <a:t>5/29/2019</a:t>
             </a:fld>
             <a:endParaRPr lang="en-US" dirty="0"/>
           </a:p>
@@ -6370,7 +6372,7 @@
           <a:p>
             <a:fld id="{53086D93-FCAC-47E0-A2EE-787E62CA814C}" type="datetimeFigureOut">
               <a:rPr lang="en-US" dirty="0"/>
-              <a:t>5/16/2019</a:t>
+              <a:t>5/29/2019</a:t>
             </a:fld>
             <a:endParaRPr lang="en-US" dirty="0"/>
           </a:p>
@@ -7338,7 +7340,7 @@
           <a:p>
             <a:fld id="{CDA879A6-0FD0-4734-A311-86BFCA472E6E}" type="datetimeFigureOut">
               <a:rPr lang="en-US" dirty="0"/>
-              <a:t>5/16/2019</a:t>
+              <a:t>5/29/2019</a:t>
             </a:fld>
             <a:endParaRPr lang="en-US" dirty="0"/>
           </a:p>
@@ -7545,7 +7547,7 @@
           <a:p>
             <a:fld id="{19C9CA7B-DFD4-44B5-8C60-D14B8CD1FB59}" type="datetimeFigureOut">
               <a:rPr lang="en-US" dirty="0"/>
-              <a:t>5/16/2019</a:t>
+              <a:t>5/29/2019</a:t>
             </a:fld>
             <a:endParaRPr lang="en-US" dirty="0"/>
           </a:p>
@@ -8575,7 +8577,7 @@
           <a:p>
             <a:fld id="{F34E6425-0181-43F2-84FC-787E803FD2F8}" type="datetimeFigureOut">
               <a:rPr lang="en-US" dirty="0"/>
-              <a:t>5/16/2019</a:t>
+              <a:t>5/29/2019</a:t>
             </a:fld>
             <a:endParaRPr lang="en-US" dirty="0"/>
           </a:p>
@@ -8843,7 +8845,7 @@
           <a:p>
             <a:fld id="{3BDB8791-F1B0-41E7-B7FD-A781E65C4266}" type="datetimeFigureOut">
               <a:rPr lang="en-US" dirty="0"/>
-              <a:t>5/16/2019</a:t>
+              <a:t>5/29/2019</a:t>
             </a:fld>
             <a:endParaRPr lang="en-US" dirty="0"/>
           </a:p>
@@ -9249,7 +9251,7 @@
           <a:p>
             <a:fld id="{5FDD63B2-E120-4ED8-B27B-C685F510A5FE}" type="datetimeFigureOut">
               <a:rPr lang="en-US" dirty="0"/>
-              <a:t>5/16/2019</a:t>
+              <a:t>5/29/2019</a:t>
             </a:fld>
             <a:endParaRPr lang="en-US" dirty="0"/>
           </a:p>
@@ -9372,7 +9374,7 @@
           <a:p>
             <a:fld id="{7AA18ACC-A947-437B-A130-35BD54FDF1E9}" type="datetimeFigureOut">
               <a:rPr lang="en-US" dirty="0"/>
-              <a:t>5/16/2019</a:t>
+              <a:t>5/29/2019</a:t>
             </a:fld>
             <a:endParaRPr lang="en-US" dirty="0"/>
           </a:p>
@@ -9463,7 +9465,7 @@
           <a:p>
             <a:fld id="{7C8D7E02-BCB8-4D50-A234-369438C08659}" type="datetimeFigureOut">
               <a:rPr lang="en-US" dirty="0"/>
-              <a:t>5/16/2019</a:t>
+              <a:t>5/29/2019</a:t>
             </a:fld>
             <a:endParaRPr lang="en-US" dirty="0"/>
           </a:p>
@@ -10540,7 +10542,7 @@
           <a:p>
             <a:fld id="{76E86A4C-8E40-4F87-A4F0-01A0687C5742}" type="datetimeFigureOut">
               <a:rPr lang="en-US" dirty="0"/>
-              <a:t>5/16/2019</a:t>
+              <a:t>5/29/2019</a:t>
             </a:fld>
             <a:endParaRPr lang="en-US" dirty="0"/>
           </a:p>
@@ -11644,7 +11646,7 @@
           <a:p>
             <a:fld id="{35E72C73-2D91-4E12-BA25-F0AA0C03599B}" type="datetimeFigureOut">
               <a:rPr lang="en-US" dirty="0"/>
-              <a:t>5/16/2019</a:t>
+              <a:t>5/29/2019</a:t>
             </a:fld>
             <a:endParaRPr lang="en-US" dirty="0"/>
           </a:p>
@@ -12637,7 +12639,7 @@
           <a:p>
             <a:fld id="{2BE451C3-0FF4-47C4-B829-773ADF60F88C}" type="datetimeFigureOut">
               <a:rPr lang="en-US" dirty="0"/>
-              <a:t>5/16/2019</a:t>
+              <a:t>5/29/2019</a:t>
             </a:fld>
             <a:endParaRPr lang="en-US" dirty="0"/>
           </a:p>
@@ -13555,9 +13557,10 @@
           </a:p>
           <a:p>
             <a:r>
-              <a:rPr lang="en-US" dirty="0"/>
-              <a:t>Example</a:t>
-            </a:r>
+              <a:rPr lang="en-US" dirty="0" smtClean="0"/>
+              <a:t>Examples</a:t>
+            </a:r>
+            <a:endParaRPr lang="en-US" dirty="0"/>
           </a:p>
           <a:p>
             <a:pPr lvl="1"/>
@@ -13758,9 +13761,10 @@
           </a:p>
           <a:p>
             <a:r>
-              <a:rPr lang="en-US" dirty="0"/>
-              <a:t>Example</a:t>
-            </a:r>
+              <a:rPr lang="en-US" dirty="0" smtClean="0"/>
+              <a:t>Examples</a:t>
+            </a:r>
+            <a:endParaRPr lang="en-US" dirty="0"/>
           </a:p>
           <a:p>
             <a:pPr lvl="1"/>
@@ -13913,9 +13917,10 @@
           </a:p>
           <a:p>
             <a:r>
-              <a:rPr lang="en-US" dirty="0"/>
-              <a:t>Example</a:t>
-            </a:r>
+              <a:rPr lang="en-US" dirty="0" smtClean="0"/>
+              <a:t>Examples</a:t>
+            </a:r>
+            <a:endParaRPr lang="en-US" dirty="0"/>
           </a:p>
           <a:p>
             <a:pPr lvl="1"/>
@@ -13935,11 +13940,7 @@
             <a:pPr lvl="1"/>
             <a:r>
               <a:rPr lang="en-US" dirty="0" smtClean="0"/>
-              <a:t>No more </a:t>
-            </a:r>
-            <a:r>
-              <a:rPr lang="en-US" dirty="0" smtClean="0"/>
-              <a:t>money</a:t>
+              <a:t>No more money</a:t>
             </a:r>
           </a:p>
           <a:p>
@@ -13953,11 +13954,7 @@
             <a:pPr lvl="1"/>
             <a:r>
               <a:rPr lang="en-US" dirty="0" smtClean="0"/>
-              <a:t>Waiters </a:t>
-            </a:r>
-            <a:r>
-              <a:rPr lang="en-US" smtClean="0"/>
-              <a:t>to Chefs </a:t>
+              <a:t>Waiters to Chefs </a:t>
             </a:r>
             <a:endParaRPr lang="en-US" dirty="0"/>
           </a:p>
@@ -13997,6 +13994,415 @@
     <p:extLst>
       <p:ext uri="{BB962C8B-B14F-4D97-AF65-F5344CB8AC3E}">
         <p14:creationId xmlns:p14="http://schemas.microsoft.com/office/powerpoint/2010/main" val="2228329078"/>
+      </p:ext>
+    </p:extLst>
+  </p:cSld>
+  <p:clrMapOvr>
+    <a:masterClrMapping/>
+  </p:clrMapOvr>
+</p:sld>
+</file>
+
+<file path=ppt/slides/slide6.xml><?xml version="1.0" encoding="utf-8"?>
+<p:sld xmlns:a="http://schemas.openxmlformats.org/drawingml/2006/main" xmlns:r="http://schemas.openxmlformats.org/officeDocument/2006/relationships" xmlns:p="http://schemas.openxmlformats.org/presentationml/2006/main">
+  <p:cSld>
+    <p:spTree>
+      <p:nvGrpSpPr>
+        <p:cNvPr id="1" name=""/>
+        <p:cNvGrpSpPr/>
+        <p:nvPr/>
+      </p:nvGrpSpPr>
+      <p:grpSpPr>
+        <a:xfrm>
+          <a:off x="0" y="0"/>
+          <a:ext cx="0" cy="0"/>
+          <a:chOff x="0" y="0"/>
+          <a:chExt cx="0" cy="0"/>
+        </a:xfrm>
+      </p:grpSpPr>
+      <p:sp>
+        <p:nvSpPr>
+          <p:cNvPr id="2" name="Title 1"/>
+          <p:cNvSpPr>
+            <a:spLocks noGrp="1"/>
+          </p:cNvSpPr>
+          <p:nvPr>
+            <p:ph type="title"/>
+          </p:nvPr>
+        </p:nvSpPr>
+        <p:spPr/>
+        <p:txBody>
+          <a:bodyPr/>
+          <a:lstStyle/>
+          <a:p>
+            <a:r>
+              <a:rPr lang="en-US" dirty="0" smtClean="0"/>
+              <a:t>Proxy - Types</a:t>
+            </a:r>
+            <a:endParaRPr lang="en-US" dirty="0"/>
+          </a:p>
+        </p:txBody>
+      </p:sp>
+      <p:sp>
+        <p:nvSpPr>
+          <p:cNvPr id="3" name="Content Placeholder 2"/>
+          <p:cNvSpPr>
+            <a:spLocks noGrp="1"/>
+          </p:cNvSpPr>
+          <p:nvPr>
+            <p:ph idx="1"/>
+          </p:nvPr>
+        </p:nvSpPr>
+        <p:spPr>
+          <a:xfrm>
+            <a:off x="1154955" y="2603500"/>
+            <a:ext cx="5885926" cy="3416300"/>
+          </a:xfrm>
+        </p:spPr>
+        <p:txBody>
+          <a:bodyPr>
+            <a:normAutofit fontScale="55000" lnSpcReduction="20000"/>
+          </a:bodyPr>
+          <a:lstStyle/>
+          <a:p>
+            <a:r>
+              <a:rPr lang="en-US" dirty="0" smtClean="0"/>
+              <a:t>When</a:t>
+            </a:r>
+          </a:p>
+          <a:p>
+            <a:pPr lvl="1"/>
+            <a:r>
+              <a:rPr lang="en-US" b="1" dirty="0"/>
+              <a:t>Virtual Proxies</a:t>
+            </a:r>
+            <a:r>
+              <a:rPr lang="en-US" dirty="0"/>
+              <a:t>: delaying the creation and initialization of expensive objects until needed, where the objects are created on </a:t>
+            </a:r>
+            <a:r>
+              <a:rPr lang="en-US" dirty="0" smtClean="0"/>
+              <a:t>demand. </a:t>
+            </a:r>
+          </a:p>
+          <a:p>
+            <a:pPr lvl="1"/>
+            <a:r>
+              <a:rPr lang="en-US" b="1" dirty="0" smtClean="0"/>
+              <a:t>Remote </a:t>
+            </a:r>
+            <a:r>
+              <a:rPr lang="en-US" b="1" dirty="0"/>
+              <a:t>Proxies</a:t>
+            </a:r>
+            <a:r>
+              <a:rPr lang="en-US" dirty="0"/>
+              <a:t>: providing a local representation for an object that is in a different address space. A common example is Java RMI stub objects. The stub object acts as a proxy where invoking methods on the stub would cause the stub to communicate and invoke methods on a remote object (called skeleton) found on a different machine. </a:t>
+            </a:r>
+          </a:p>
+          <a:p>
+            <a:pPr lvl="1"/>
+            <a:r>
+              <a:rPr lang="en-US" b="1" dirty="0"/>
+              <a:t>Protection Proxies</a:t>
+            </a:r>
+            <a:r>
+              <a:rPr lang="en-US" dirty="0"/>
+              <a:t>: where a proxy controls access </a:t>
+            </a:r>
+            <a:r>
+              <a:rPr lang="en-US" dirty="0" smtClean="0"/>
+              <a:t>by </a:t>
+            </a:r>
+            <a:r>
+              <a:rPr lang="en-US" dirty="0"/>
+              <a:t>giving access to some objects while denying access to others.</a:t>
+            </a:r>
+          </a:p>
+          <a:p>
+            <a:pPr lvl="1"/>
+            <a:r>
+              <a:rPr lang="en-US" b="1" dirty="0"/>
+              <a:t>Smart References</a:t>
+            </a:r>
+            <a:r>
+              <a:rPr lang="en-US" dirty="0"/>
+              <a:t>: providing a sophisticated access to certain objects such as tracking the number of references to an object and denying access if a certain number is reached, as well as loading an object from database into memory on demand</a:t>
+            </a:r>
+            <a:r>
+              <a:rPr lang="en-US" dirty="0" smtClean="0"/>
+              <a:t>.</a:t>
+            </a:r>
+            <a:r>
+              <a:rPr lang="en-US" dirty="0"/>
+              <a:t> A smart proxy provides additional layer of security by interposing specific actions when the object is accessed. An example can be to check if the real object is locked before it is accessed to ensure that no other object can change it.</a:t>
+            </a:r>
+            <a:endParaRPr lang="en-US" dirty="0" smtClean="0"/>
+          </a:p>
+          <a:p>
+            <a:r>
+              <a:rPr lang="en-US" dirty="0" smtClean="0"/>
+              <a:t>When </a:t>
+            </a:r>
+            <a:r>
+              <a:rPr lang="en-US" dirty="0"/>
+              <a:t>you use some third party class and you can’t just rewrite it</a:t>
+            </a:r>
+            <a:r>
+              <a:rPr lang="en-US" dirty="0" smtClean="0"/>
+              <a:t>.</a:t>
+            </a:r>
+          </a:p>
+          <a:p>
+            <a:r>
+              <a:rPr lang="en-US" dirty="0" smtClean="0"/>
+              <a:t>When you don’t want to mess business logic with caching logic for example, or lazy loading.</a:t>
+            </a:r>
+          </a:p>
+          <a:p>
+            <a:r>
+              <a:rPr lang="en-US" dirty="0"/>
+              <a:t>https://stackoverflow.com/questions/18618779/differences-between-proxy-and-decorator-pattern</a:t>
+            </a:r>
+          </a:p>
+          <a:p>
+            <a:endParaRPr lang="en-US" dirty="0"/>
+          </a:p>
+        </p:txBody>
+      </p:sp>
+      <p:pic>
+        <p:nvPicPr>
+          <p:cNvPr id="4" name="Picture 3"/>
+          <p:cNvPicPr>
+            <a:picLocks noChangeAspect="1"/>
+          </p:cNvPicPr>
+          <p:nvPr/>
+        </p:nvPicPr>
+        <p:blipFill>
+          <a:blip r:embed="rId2">
+            <a:extLst>
+              <a:ext uri="{28A0092B-C50C-407E-A947-70E740481C1C}">
+                <a14:useLocalDpi xmlns:a14="http://schemas.microsoft.com/office/drawing/2010/main" val="0"/>
+              </a:ext>
+            </a:extLst>
+          </a:blip>
+          <a:stretch>
+            <a:fillRect/>
+          </a:stretch>
+        </p:blipFill>
+        <p:spPr>
+          <a:xfrm>
+            <a:off x="7227515" y="3093951"/>
+            <a:ext cx="4420714" cy="2490239"/>
+          </a:xfrm>
+          <a:prstGeom prst="rect">
+            <a:avLst/>
+          </a:prstGeom>
+        </p:spPr>
+      </p:pic>
+    </p:spTree>
+    <p:extLst>
+      <p:ext uri="{BB962C8B-B14F-4D97-AF65-F5344CB8AC3E}">
+        <p14:creationId xmlns:p14="http://schemas.microsoft.com/office/powerpoint/2010/main" val="3618088317"/>
+      </p:ext>
+    </p:extLst>
+  </p:cSld>
+  <p:clrMapOvr>
+    <a:masterClrMapping/>
+  </p:clrMapOvr>
+</p:sld>
+</file>
+
+<file path=ppt/slides/slide7.xml><?xml version="1.0" encoding="utf-8"?>
+<p:sld xmlns:a="http://schemas.openxmlformats.org/drawingml/2006/main" xmlns:r="http://schemas.openxmlformats.org/officeDocument/2006/relationships" xmlns:p="http://schemas.openxmlformats.org/presentationml/2006/main">
+  <p:cSld>
+    <p:spTree>
+      <p:nvGrpSpPr>
+        <p:cNvPr id="1" name=""/>
+        <p:cNvGrpSpPr/>
+        <p:nvPr/>
+      </p:nvGrpSpPr>
+      <p:grpSpPr>
+        <a:xfrm>
+          <a:off x="0" y="0"/>
+          <a:ext cx="0" cy="0"/>
+          <a:chOff x="0" y="0"/>
+          <a:chExt cx="0" cy="0"/>
+        </a:xfrm>
+      </p:grpSpPr>
+      <p:sp>
+        <p:nvSpPr>
+          <p:cNvPr id="2" name="Title 1"/>
+          <p:cNvSpPr>
+            <a:spLocks noGrp="1"/>
+          </p:cNvSpPr>
+          <p:nvPr>
+            <p:ph type="title"/>
+          </p:nvPr>
+        </p:nvSpPr>
+        <p:spPr/>
+        <p:txBody>
+          <a:bodyPr/>
+          <a:lstStyle/>
+          <a:p>
+            <a:r>
+              <a:rPr lang="en-US" dirty="0" smtClean="0"/>
+              <a:t>Proxy - Examples</a:t>
+            </a:r>
+            <a:endParaRPr lang="en-US" dirty="0"/>
+          </a:p>
+        </p:txBody>
+      </p:sp>
+      <p:sp>
+        <p:nvSpPr>
+          <p:cNvPr id="3" name="Content Placeholder 2"/>
+          <p:cNvSpPr>
+            <a:spLocks noGrp="1"/>
+          </p:cNvSpPr>
+          <p:nvPr>
+            <p:ph idx="1"/>
+          </p:nvPr>
+        </p:nvSpPr>
+        <p:spPr/>
+        <p:txBody>
+          <a:bodyPr/>
+          <a:lstStyle/>
+          <a:p>
+            <a:r>
+              <a:rPr lang="en-US" dirty="0" smtClean="0"/>
+              <a:t>Examples</a:t>
+            </a:r>
+          </a:p>
+          <a:p>
+            <a:pPr lvl="1"/>
+            <a:r>
+              <a:rPr lang="en-US" dirty="0" err="1" smtClean="0"/>
+              <a:t>HighResolutionImage</a:t>
+            </a:r>
+            <a:r>
+              <a:rPr lang="en-US" dirty="0" smtClean="0"/>
+              <a:t> loading (Virtual)</a:t>
+            </a:r>
+          </a:p>
+          <a:p>
+            <a:pPr lvl="1"/>
+            <a:r>
+              <a:rPr lang="en-US" dirty="0" err="1" smtClean="0"/>
+              <a:t>EntityFramework</a:t>
+            </a:r>
+            <a:r>
+              <a:rPr lang="en-US" dirty="0" smtClean="0"/>
+              <a:t> (Virtual)</a:t>
+            </a:r>
+          </a:p>
+          <a:p>
+            <a:pPr lvl="1"/>
+            <a:r>
+              <a:rPr lang="en-US" dirty="0" smtClean="0"/>
+              <a:t>Socket (Virtual)</a:t>
+            </a:r>
+          </a:p>
+          <a:p>
+            <a:pPr lvl="1"/>
+            <a:r>
+              <a:rPr lang="en-US" dirty="0" smtClean="0"/>
+              <a:t>Blocked IP addresses (Protection)</a:t>
+            </a:r>
+          </a:p>
+          <a:p>
+            <a:pPr lvl="1"/>
+            <a:r>
+              <a:rPr lang="en-US" dirty="0" smtClean="0"/>
+              <a:t>Caching (Virtual)</a:t>
+            </a:r>
+          </a:p>
+          <a:p>
+            <a:pPr lvl="1"/>
+            <a:r>
+              <a:rPr lang="en-US" dirty="0">
+                <a:hlinkClick r:id="rId2"/>
+              </a:rPr>
+              <a:t>https://</a:t>
+            </a:r>
+            <a:r>
+              <a:rPr lang="en-US" dirty="0" smtClean="0">
+                <a:hlinkClick r:id="rId2"/>
+              </a:rPr>
+              <a:t>sourcemaking.com/design_patterns/proxy/java/1</a:t>
+            </a:r>
+            <a:endParaRPr lang="en-US" dirty="0" smtClean="0"/>
+          </a:p>
+          <a:p>
+            <a:pPr lvl="1"/>
+            <a:r>
+              <a:rPr lang="en-US" dirty="0" err="1" smtClean="0"/>
+              <a:t>Cheque</a:t>
+            </a:r>
+            <a:r>
+              <a:rPr lang="en-US" dirty="0"/>
+              <a:t>/</a:t>
+            </a:r>
+            <a:r>
+              <a:rPr lang="en-US" dirty="0" smtClean="0"/>
+              <a:t>credit </a:t>
+            </a:r>
+            <a:r>
+              <a:rPr lang="en-US" dirty="0"/>
+              <a:t>card is a proxy for what is </a:t>
+            </a:r>
+            <a:r>
+              <a:rPr lang="en-US" dirty="0" smtClean="0"/>
+              <a:t>in </a:t>
+            </a:r>
+            <a:r>
+              <a:rPr lang="en-US" dirty="0"/>
+              <a:t>our bank account</a:t>
+            </a:r>
+            <a:endParaRPr lang="en-US" dirty="0" smtClean="0"/>
+          </a:p>
+          <a:p>
+            <a:pPr lvl="1"/>
+            <a:endParaRPr lang="en-US" dirty="0"/>
+          </a:p>
+          <a:p>
+            <a:endParaRPr lang="en-US" dirty="0"/>
+          </a:p>
+        </p:txBody>
+      </p:sp>
+      <p:pic>
+        <p:nvPicPr>
+          <p:cNvPr id="4" name="Picture 3"/>
+          <p:cNvPicPr>
+            <a:picLocks noChangeAspect="1"/>
+          </p:cNvPicPr>
+          <p:nvPr/>
+        </p:nvPicPr>
+        <p:blipFill>
+          <a:blip r:embed="rId3">
+            <a:extLst>
+              <a:ext uri="{28A0092B-C50C-407E-A947-70E740481C1C}">
+                <a14:useLocalDpi xmlns:a14="http://schemas.microsoft.com/office/drawing/2010/main" val="0"/>
+              </a:ext>
+            </a:extLst>
+          </a:blip>
+          <a:stretch>
+            <a:fillRect/>
+          </a:stretch>
+        </p:blipFill>
+        <p:spPr>
+          <a:xfrm>
+            <a:off x="7813864" y="2477943"/>
+            <a:ext cx="3605309" cy="2703137"/>
+          </a:xfrm>
+          <a:prstGeom prst="rect">
+            <a:avLst/>
+          </a:prstGeom>
+        </p:spPr>
+      </p:pic>
+    </p:spTree>
+    <p:extLst>
+      <p:ext uri="{BB962C8B-B14F-4D97-AF65-F5344CB8AC3E}">
+        <p14:creationId xmlns:p14="http://schemas.microsoft.com/office/powerpoint/2010/main" val="3261850036"/>
       </p:ext>
     </p:extLst>
   </p:cSld>

</xml_diff>